<commit_message>
kopierat V-MIM för mödravård till PPT-filen
</commit_message>
<xml_diff>
--- a/ServiceInteractions/riv/clinicalprocess/healthcond/actoutcome/trunk/docs/TD_clinicalprocess_healthcond_actoutcome.pptx
+++ b/ServiceInteractions/riv/clinicalprocess/healthcond/actoutcome/trunk/docs/TD_clinicalprocess_healthcond_actoutcome.pptx
@@ -6,10 +6,10 @@
     <p:sldMasterId id="2147483670" r:id="rId2"/>
   </p:sldMasterIdLst>
   <p:notesMasterIdLst>
-    <p:notesMasterId r:id="rId13"/>
+    <p:notesMasterId r:id="rId14"/>
   </p:notesMasterIdLst>
   <p:handoutMasterIdLst>
-    <p:handoutMasterId r:id="rId14"/>
+    <p:handoutMasterId r:id="rId15"/>
   </p:handoutMasterIdLst>
   <p:sldIdLst>
     <p:sldId id="324" r:id="rId3"/>
@@ -22,6 +22,7 @@
     <p:sldId id="331" r:id="rId10"/>
     <p:sldId id="332" r:id="rId11"/>
     <p:sldId id="333" r:id="rId12"/>
+    <p:sldId id="335" r:id="rId13"/>
   </p:sldIdLst>
   <p:sldSz cx="9144000" cy="6858000" type="screen4x3"/>
   <p:notesSz cx="6858000" cy="9144000"/>
@@ -206,7 +207,7 @@
             <a:fld id="{A1CCCE65-3320-6145-9FE0-1D4F0AE2F80D}" type="datetimeFigureOut">
               <a:rPr lang="sv-SE" smtClean="0"/>
               <a:pPr/>
-              <a:t>2013-05-07</a:t>
+              <a:t>2013-06-22</a:t>
             </a:fld>
             <a:endParaRPr lang="sv-SE"/>
           </a:p>
@@ -373,7 +374,7 @@
             <a:fld id="{48064D6E-32A5-4333-B2C8-253366DFFB1E}" type="datetimeFigureOut">
               <a:rPr lang="sv-SE" smtClean="0"/>
               <a:pPr/>
-              <a:t>2013-05-07</a:t>
+              <a:t>2013-06-22</a:t>
             </a:fld>
             <a:endParaRPr lang="sv-SE"/>
           </a:p>
@@ -810,7 +811,7 @@
             <a:fld id="{793AEFA7-59BA-446D-B708-A2D615D75329}" type="datetimeFigureOut">
               <a:rPr lang="sv-SE" smtClean="0"/>
               <a:pPr defTabSz="895350"/>
-              <a:t>2013-05-07</a:t>
+              <a:t>2013-06-22</a:t>
             </a:fld>
             <a:r>
               <a:rPr lang="sv-SE" dirty="0" smtClean="0"/>
@@ -1285,7 +1286,7 @@
             <a:fld id="{793AEFA7-59BA-446D-B708-A2D615D75329}" type="datetimeFigureOut">
               <a:rPr lang="sv-SE" smtClean="0"/>
               <a:pPr defTabSz="895350"/>
-              <a:t>2013-05-07</a:t>
+              <a:t>2013-06-22</a:t>
             </a:fld>
             <a:r>
               <a:rPr lang="sv-SE" dirty="0" smtClean="0"/>
@@ -1743,7 +1744,7 @@
             <a:fld id="{793AEFA7-59BA-446D-B708-A2D615D75329}" type="datetimeFigureOut">
               <a:rPr lang="sv-SE" smtClean="0"/>
               <a:pPr defTabSz="895350"/>
-              <a:t>2013-05-07</a:t>
+              <a:t>2013-06-22</a:t>
             </a:fld>
             <a:r>
               <a:rPr lang="sv-SE" dirty="0" smtClean="0"/>
@@ -1952,7 +1953,7 @@
             <a:fld id="{793AEFA7-59BA-446D-B708-A2D615D75329}" type="datetimeFigureOut">
               <a:rPr lang="sv-SE" smtClean="0"/>
               <a:pPr defTabSz="895350"/>
-              <a:t>2013-05-07</a:t>
+              <a:t>2013-06-22</a:t>
             </a:fld>
             <a:r>
               <a:rPr lang="sv-SE" dirty="0" smtClean="0"/>
@@ -2180,7 +2181,7 @@
             <a:fld id="{793AEFA7-59BA-446D-B708-A2D615D75329}" type="datetimeFigureOut">
               <a:rPr lang="sv-SE" smtClean="0"/>
               <a:pPr defTabSz="895350"/>
-              <a:t>2013-05-07</a:t>
+              <a:t>2013-06-22</a:t>
             </a:fld>
             <a:r>
               <a:rPr lang="sv-SE" dirty="0" smtClean="0"/>
@@ -2575,7 +2576,7 @@
             <a:fld id="{793AEFA7-59BA-446D-B708-A2D615D75329}" type="datetimeFigureOut">
               <a:rPr lang="sv-SE" smtClean="0"/>
               <a:pPr defTabSz="895350"/>
-              <a:t>2013-05-07</a:t>
+              <a:t>2013-06-22</a:t>
             </a:fld>
             <a:r>
               <a:rPr lang="sv-SE" dirty="0" smtClean="0"/>
@@ -3058,7 +3059,7 @@
             <a:fld id="{793AEFA7-59BA-446D-B708-A2D615D75329}" type="datetimeFigureOut">
               <a:rPr lang="sv-SE" smtClean="0"/>
               <a:pPr/>
-              <a:t>2013-05-07</a:t>
+              <a:t>2013-06-22</a:t>
             </a:fld>
             <a:endParaRPr lang="sv-SE" dirty="0"/>
           </a:p>
@@ -3568,7 +3569,7 @@
             <a:fld id="{1557CB54-6EE6-4E9A-A5F4-26576EC193CD}" type="datetimeFigureOut">
               <a:rPr lang="sv-SE" smtClean="0"/>
               <a:pPr/>
-              <a:t>2013-05-07</a:t>
+              <a:t>2013-06-22</a:t>
             </a:fld>
             <a:endParaRPr lang="sv-SE"/>
           </a:p>
@@ -4175,7 +4176,7 @@
             <a:fld id="{793AEFA7-59BA-446D-B708-A2D615D75329}" type="datetimeFigureOut">
               <a:rPr lang="sv-SE" smtClean="0"/>
               <a:pPr defTabSz="895350"/>
-              <a:t>2013-05-07</a:t>
+              <a:t>2013-06-22</a:t>
             </a:fld>
             <a:r>
               <a:rPr lang="sv-SE" smtClean="0"/>
@@ -5797,6 +5798,130 @@
       </p:par>
     </p:tnLst>
   </p:timing>
+</p:sld>
+</file>
+
+<file path=ppt/slides/slide11.xml><?xml version="1.0" encoding="utf-8"?>
+<p:sld xmlns:a="http://schemas.openxmlformats.org/drawingml/2006/main" xmlns:r="http://schemas.openxmlformats.org/officeDocument/2006/relationships" xmlns:p="http://schemas.openxmlformats.org/presentationml/2006/main">
+  <p:cSld>
+    <p:spTree>
+      <p:nvGrpSpPr>
+        <p:cNvPr id="1" name=""/>
+        <p:cNvGrpSpPr/>
+        <p:nvPr/>
+      </p:nvGrpSpPr>
+      <p:grpSpPr>
+        <a:xfrm>
+          <a:off x="0" y="0"/>
+          <a:ext cx="0" cy="0"/>
+          <a:chOff x="0" y="0"/>
+          <a:chExt cx="0" cy="0"/>
+        </a:xfrm>
+      </p:grpSpPr>
+      <p:sp>
+        <p:nvSpPr>
+          <p:cNvPr id="2" name="Rubrik 1"/>
+          <p:cNvSpPr>
+            <a:spLocks noGrp="1"/>
+          </p:cNvSpPr>
+          <p:nvPr>
+            <p:ph type="title"/>
+          </p:nvPr>
+        </p:nvSpPr>
+        <p:spPr/>
+        <p:txBody>
+          <a:bodyPr/>
+          <a:lstStyle/>
+          <a:p>
+            <a:r>
+              <a:rPr lang="sv-SE" dirty="0" smtClean="0"/>
+              <a:t>V-MIM </a:t>
+            </a:r>
+            <a:r>
+              <a:rPr lang="sv-SE" dirty="0" err="1" smtClean="0"/>
+              <a:t>GetMaternityMedicalHistort</a:t>
+            </a:r>
+            <a:endParaRPr lang="sv-SE" dirty="0"/>
+          </a:p>
+        </p:txBody>
+      </p:sp>
+      <p:sp>
+        <p:nvSpPr>
+          <p:cNvPr id="4" name="Platshållare för bildnummer 3"/>
+          <p:cNvSpPr>
+            <a:spLocks noGrp="1"/>
+          </p:cNvSpPr>
+          <p:nvPr>
+            <p:ph type="sldNum" sz="quarter" idx="12"/>
+          </p:nvPr>
+        </p:nvSpPr>
+        <p:spPr/>
+        <p:txBody>
+          <a:bodyPr/>
+          <a:lstStyle/>
+          <a:p>
+            <a:pPr defTabSz="895350"/>
+            <a:fld id="{793AEFA7-59BA-446D-B708-A2D615D75329}" type="datetimeFigureOut">
+              <a:rPr lang="sv-SE" smtClean="0"/>
+              <a:pPr defTabSz="895350"/>
+              <a:t>2013-06-22</a:t>
+            </a:fld>
+            <a:r>
+              <a:rPr lang="sv-SE" smtClean="0"/>
+              <a:t>     sid </a:t>
+            </a:r>
+            <a:fld id="{8BB3268F-30C5-4CD2-9024-B4739203B4BF}" type="slidenum">
+              <a:rPr lang="sv-SE" smtClean="0"/>
+              <a:pPr defTabSz="895350"/>
+              <a:t>11</a:t>
+            </a:fld>
+            <a:endParaRPr lang="sv-SE" dirty="0"/>
+          </a:p>
+        </p:txBody>
+      </p:sp>
+      <p:pic>
+        <p:nvPicPr>
+          <p:cNvPr id="5" name="Bild 6"/>
+          <p:cNvPicPr/>
+          <p:nvPr/>
+        </p:nvPicPr>
+        <p:blipFill>
+          <a:blip r:embed="rId2">
+            <a:extLst>
+              <a:ext uri="{28A0092B-C50C-407E-A947-70E740481C1C}">
+                <a14:useLocalDpi xmlns:a14="http://schemas.microsoft.com/office/drawing/2010/main" val="0"/>
+              </a:ext>
+            </a:extLst>
+          </a:blip>
+          <a:srcRect/>
+          <a:stretch>
+            <a:fillRect/>
+          </a:stretch>
+        </p:blipFill>
+        <p:spPr bwMode="auto">
+          <a:xfrm>
+            <a:off x="395536" y="1700808"/>
+            <a:ext cx="8328813" cy="4248472"/>
+          </a:xfrm>
+          <a:prstGeom prst="rect">
+            <a:avLst/>
+          </a:prstGeom>
+          <a:noFill/>
+          <a:ln>
+            <a:noFill/>
+          </a:ln>
+        </p:spPr>
+      </p:pic>
+    </p:spTree>
+    <p:extLst>
+      <p:ext uri="{BB962C8B-B14F-4D97-AF65-F5344CB8AC3E}">
+        <p14:creationId xmlns:p14="http://schemas.microsoft.com/office/powerpoint/2010/main" val="1821343160"/>
+      </p:ext>
+    </p:extLst>
+  </p:cSld>
+  <p:clrMapOvr>
+    <a:masterClrMapping/>
+  </p:clrMapOvr>
 </p:sld>
 </file>
 
@@ -13638,7 +13763,7 @@
             <a:fld id="{793AEFA7-59BA-446D-B708-A2D615D75329}" type="datetimeFigureOut">
               <a:rPr lang="sv-SE" smtClean="0"/>
               <a:pPr defTabSz="895350"/>
-              <a:t>2013-05-07</a:t>
+              <a:t>2013-06-22</a:t>
             </a:fld>
             <a:r>
               <a:rPr lang="sv-SE" smtClean="0"/>
@@ -16113,7 +16238,7 @@
             <a:fld id="{793AEFA7-59BA-446D-B708-A2D615D75329}" type="datetimeFigureOut">
               <a:rPr lang="sv-SE" smtClean="0"/>
               <a:pPr defTabSz="895350"/>
-              <a:t>2013-05-07</a:t>
+              <a:t>2013-06-22</a:t>
             </a:fld>
             <a:r>
               <a:rPr lang="sv-SE" smtClean="0"/>
@@ -17915,7 +18040,7 @@
             <a:fld id="{793AEFA7-59BA-446D-B708-A2D615D75329}" type="datetimeFigureOut">
               <a:rPr lang="sv-SE" smtClean="0"/>
               <a:pPr defTabSz="895350"/>
-              <a:t>2013-05-07</a:t>
+              <a:t>2013-06-22</a:t>
             </a:fld>
             <a:r>
               <a:rPr lang="sv-SE" smtClean="0"/>
@@ -19737,15 +19862,7 @@
                   <a:srgbClr val="000000"/>
                 </a:solidFill>
               </a:rPr>
-              <a:t> </a:t>
-            </a:r>
-            <a:r>
-              <a:rPr lang="en-GB" sz="1000" dirty="0" smtClean="0">
-                <a:solidFill>
-                  <a:srgbClr val="000000"/>
-                </a:solidFill>
-              </a:rPr>
-              <a:t>de </a:t>
+              <a:t> de </a:t>
             </a:r>
             <a:r>
               <a:rPr lang="en-GB" sz="1000" dirty="0" err="1" smtClean="0">
@@ -20253,7 +20370,7 @@
             <a:fld id="{793AEFA7-59BA-446D-B708-A2D615D75329}" type="datetimeFigureOut">
               <a:rPr lang="sv-SE" smtClean="0"/>
               <a:pPr defTabSz="895350"/>
-              <a:t>2013-05-07</a:t>
+              <a:t>2013-06-22</a:t>
             </a:fld>
             <a:r>
               <a:rPr lang="sv-SE" smtClean="0"/>
@@ -21582,11 +21699,6 @@
               </a:rPr>
               <a:t>.</a:t>
             </a:r>
-            <a:endParaRPr lang="en-GB" sz="1000" dirty="0">
-              <a:solidFill>
-                <a:srgbClr val="000000"/>
-              </a:solidFill>
-            </a:endParaRPr>
           </a:p>
         </p:txBody>
       </p:sp>

</xml_diff>